<commit_message>
#72 updated doc with new upgrade button
</commit_message>
<xml_diff>
--- a/Documents/GSC FIELD APP GUIDE PRINTABLE BOOKLET.pptx
+++ b/Documents/GSC FIELD APP GUIDE PRINTABLE BOOKLET.pptx
@@ -267,7 +267,7 @@
           <a:p>
             <a:fld id="{18B48733-39D0-42D1-B07B-120E66BD2738}" type="datetimeFigureOut">
               <a:rPr lang="fr-FR" smtClean="0"/>
-              <a:t>06/02/2019</a:t>
+              <a:t>11/08/2021</a:t>
             </a:fld>
             <a:endParaRPr lang="fr-FR"/>
           </a:p>
@@ -437,7 +437,7 @@
           <a:p>
             <a:fld id="{18B48733-39D0-42D1-B07B-120E66BD2738}" type="datetimeFigureOut">
               <a:rPr lang="fr-FR" smtClean="0"/>
-              <a:t>06/02/2019</a:t>
+              <a:t>11/08/2021</a:t>
             </a:fld>
             <a:endParaRPr lang="fr-FR"/>
           </a:p>
@@ -617,7 +617,7 @@
           <a:p>
             <a:fld id="{18B48733-39D0-42D1-B07B-120E66BD2738}" type="datetimeFigureOut">
               <a:rPr lang="fr-FR" smtClean="0"/>
-              <a:t>06/02/2019</a:t>
+              <a:t>11/08/2021</a:t>
             </a:fld>
             <a:endParaRPr lang="fr-FR"/>
           </a:p>
@@ -787,7 +787,7 @@
           <a:p>
             <a:fld id="{18B48733-39D0-42D1-B07B-120E66BD2738}" type="datetimeFigureOut">
               <a:rPr lang="fr-FR" smtClean="0"/>
-              <a:t>06/02/2019</a:t>
+              <a:t>11/08/2021</a:t>
             </a:fld>
             <a:endParaRPr lang="fr-FR"/>
           </a:p>
@@ -1031,7 +1031,7 @@
           <a:p>
             <a:fld id="{18B48733-39D0-42D1-B07B-120E66BD2738}" type="datetimeFigureOut">
               <a:rPr lang="fr-FR" smtClean="0"/>
-              <a:t>06/02/2019</a:t>
+              <a:t>11/08/2021</a:t>
             </a:fld>
             <a:endParaRPr lang="fr-FR"/>
           </a:p>
@@ -1263,7 +1263,7 @@
           <a:p>
             <a:fld id="{18B48733-39D0-42D1-B07B-120E66BD2738}" type="datetimeFigureOut">
               <a:rPr lang="fr-FR" smtClean="0"/>
-              <a:t>06/02/2019</a:t>
+              <a:t>11/08/2021</a:t>
             </a:fld>
             <a:endParaRPr lang="fr-FR"/>
           </a:p>
@@ -1630,7 +1630,7 @@
           <a:p>
             <a:fld id="{18B48733-39D0-42D1-B07B-120E66BD2738}" type="datetimeFigureOut">
               <a:rPr lang="fr-FR" smtClean="0"/>
-              <a:t>06/02/2019</a:t>
+              <a:t>11/08/2021</a:t>
             </a:fld>
             <a:endParaRPr lang="fr-FR"/>
           </a:p>
@@ -1748,7 +1748,7 @@
           <a:p>
             <a:fld id="{18B48733-39D0-42D1-B07B-120E66BD2738}" type="datetimeFigureOut">
               <a:rPr lang="fr-FR" smtClean="0"/>
-              <a:t>06/02/2019</a:t>
+              <a:t>11/08/2021</a:t>
             </a:fld>
             <a:endParaRPr lang="fr-FR"/>
           </a:p>
@@ -1843,7 +1843,7 @@
           <a:p>
             <a:fld id="{18B48733-39D0-42D1-B07B-120E66BD2738}" type="datetimeFigureOut">
               <a:rPr lang="fr-FR" smtClean="0"/>
-              <a:t>06/02/2019</a:t>
+              <a:t>11/08/2021</a:t>
             </a:fld>
             <a:endParaRPr lang="fr-FR"/>
           </a:p>
@@ -2120,7 +2120,7 @@
           <a:p>
             <a:fld id="{18B48733-39D0-42D1-B07B-120E66BD2738}" type="datetimeFigureOut">
               <a:rPr lang="fr-FR" smtClean="0"/>
-              <a:t>06/02/2019</a:t>
+              <a:t>11/08/2021</a:t>
             </a:fld>
             <a:endParaRPr lang="fr-FR"/>
           </a:p>
@@ -2377,7 +2377,7 @@
           <a:p>
             <a:fld id="{18B48733-39D0-42D1-B07B-120E66BD2738}" type="datetimeFigureOut">
               <a:rPr lang="fr-FR" smtClean="0"/>
-              <a:t>06/02/2019</a:t>
+              <a:t>11/08/2021</a:t>
             </a:fld>
             <a:endParaRPr lang="fr-FR"/>
           </a:p>
@@ -2590,7 +2590,7 @@
           <a:p>
             <a:fld id="{18B48733-39D0-42D1-B07B-120E66BD2738}" type="datetimeFigureOut">
               <a:rPr lang="fr-FR" smtClean="0"/>
-              <a:t>06/02/2019</a:t>
+              <a:t>11/08/2021</a:t>
             </a:fld>
             <a:endParaRPr lang="fr-FR"/>
           </a:p>
@@ -3424,7 +3424,6 @@
               <a:rPr lang="en-CA" sz="1100" dirty="0" smtClean="0"/>
               <a:t>reordered, deleted and have its transparency set.</a:t>
             </a:r>
-            <a:endParaRPr lang="en-CA" sz="1100" dirty="0" smtClean="0"/>
           </a:p>
           <a:p>
             <a:pPr marL="742950" lvl="1" indent="-285750" algn="just">
@@ -3447,11 +3446,7 @@
             </a:pPr>
             <a:r>
               <a:rPr lang="en-CA" sz="1100" b="1" dirty="0" smtClean="0"/>
-              <a:t>GPS </a:t>
-            </a:r>
-            <a:r>
-              <a:rPr lang="en-CA" sz="1100" b="1" dirty="0" smtClean="0"/>
-              <a:t>Mode</a:t>
+              <a:t>GPS Mode</a:t>
             </a:r>
             <a:r>
               <a:rPr lang="en-CA" sz="1100" dirty="0" smtClean="0"/>
@@ -3465,7 +3460,6 @@
               <a:rPr lang="en-CA" sz="1100" dirty="0" smtClean="0"/>
               <a:t>/Enable GPS</a:t>
             </a:r>
-            <a:endParaRPr lang="en-CA" sz="1100" dirty="0" smtClean="0"/>
           </a:p>
           <a:p>
             <a:pPr marL="1200150" lvl="2" indent="-285750" algn="just">
@@ -3499,13 +3493,7 @@
               <a:rPr lang="en-CA" sz="1100" b="1" dirty="0" smtClean="0">
                 <a:sym typeface="Wingdings" panose="05000000000000000000" pitchFamily="2" charset="2"/>
               </a:rPr>
-              <a:t>Center colored </a:t>
-            </a:r>
-            <a:r>
-              <a:rPr lang="en-CA" sz="1100" b="1" dirty="0" smtClean="0">
-                <a:sym typeface="Wingdings" panose="05000000000000000000" pitchFamily="2" charset="2"/>
-              </a:rPr>
-              <a:t>dot</a:t>
+              <a:t>Center colored dot</a:t>
             </a:r>
             <a:r>
               <a:rPr lang="en-CA" sz="1100" dirty="0" smtClean="0">
@@ -3523,35 +3511,14 @@
               <a:rPr lang="en-CA" sz="1100" b="1" dirty="0" smtClean="0">
                 <a:sym typeface="Wingdings" panose="05000000000000000000" pitchFamily="2" charset="2"/>
               </a:rPr>
-              <a:t>Circle </a:t>
-            </a:r>
-            <a:r>
-              <a:rPr lang="en-CA" sz="1100" b="1" dirty="0" smtClean="0">
-                <a:sym typeface="Wingdings" panose="05000000000000000000" pitchFamily="2" charset="2"/>
-              </a:rPr>
-              <a:t>around dot</a:t>
+              <a:t>Circle around dot</a:t>
             </a:r>
             <a:r>
               <a:rPr lang="en-CA" sz="1100" dirty="0" smtClean="0">
                 <a:sym typeface="Wingdings" panose="05000000000000000000" pitchFamily="2" charset="2"/>
               </a:rPr>
-              <a:t>: Visual accuracy of the current GPS location. A wider circle indicates a less accurate coordinate</a:t>
-            </a:r>
-            <a:r>
-              <a:rPr lang="en-CA" sz="1100" dirty="0" smtClean="0">
-                <a:sym typeface="Wingdings" panose="05000000000000000000" pitchFamily="2" charset="2"/>
-              </a:rPr>
-              <a:t>. </a:t>
-            </a:r>
-            <a:r>
-              <a:rPr lang="en-CA" sz="1100" dirty="0" smtClean="0">
-                <a:sym typeface="Wingdings" panose="05000000000000000000" pitchFamily="2" charset="2"/>
-              </a:rPr>
-              <a:t>Circle is to scale based on accuracy. Red color means a poor accuracy of 40 meters and higher, yellow means a tolerable accuracy between 20 and 40 m, and green means a good accuracy below 20 m.</a:t>
-            </a:r>
-            <a:endParaRPr lang="en-CA" sz="1100" dirty="0" smtClean="0">
-              <a:sym typeface="Wingdings" panose="05000000000000000000" pitchFamily="2" charset="2"/>
-            </a:endParaRPr>
+              <a:t>: Visual accuracy of the current GPS location. A wider circle indicates a less accurate coordinate. Circle is to scale based on accuracy. Red color means a poor accuracy of 40 meters and higher, yellow means a tolerable accuracy between 20 and 40 m, and green means a good accuracy below 20 m.</a:t>
+            </a:r>
           </a:p>
           <a:p>
             <a:pPr marL="628650" lvl="1" indent="-171450" algn="just">
@@ -3562,13 +3529,7 @@
               <a:rPr lang="en-CA" sz="1100" b="1" dirty="0" smtClean="0">
                 <a:sym typeface="Wingdings" panose="05000000000000000000" pitchFamily="2" charset="2"/>
               </a:rPr>
-              <a:t>Upper </a:t>
-            </a:r>
-            <a:r>
-              <a:rPr lang="en-CA" sz="1100" b="1" dirty="0" smtClean="0">
-                <a:sym typeface="Wingdings" panose="05000000000000000000" pitchFamily="2" charset="2"/>
-              </a:rPr>
-              <a:t>left text</a:t>
+              <a:t>Upper left text</a:t>
             </a:r>
             <a:r>
               <a:rPr lang="en-CA" sz="1100" dirty="0" smtClean="0">
@@ -5800,7 +5761,7 @@
         <p:spPr>
           <a:xfrm>
             <a:off x="7980600" y="3499199"/>
-            <a:ext cx="7220297" cy="3162404"/>
+            <a:ext cx="7220297" cy="3323987"/>
           </a:xfrm>
           <a:prstGeom prst="rect">
             <a:avLst/>
@@ -6022,6 +5983,21 @@
               <a:rPr lang="en-CA" sz="1050" dirty="0" smtClean="0"/>
               <a:t>.</a:t>
             </a:r>
+          </a:p>
+          <a:p>
+            <a:pPr marL="742950" lvl="1" indent="-285750">
+              <a:buFont typeface="+mj-lt"/>
+              <a:buAutoNum type="arabicPeriod"/>
+            </a:pPr>
+            <a:r>
+              <a:rPr lang="en-CA" sz="1050" b="1" dirty="0" smtClean="0"/>
+              <a:t>Upgrade: </a:t>
+            </a:r>
+            <a:r>
+              <a:rPr lang="en-CA" sz="1050" dirty="0" smtClean="0"/>
+              <a:t>Will upgrade field book database schema to latest one.</a:t>
+            </a:r>
+            <a:endParaRPr lang="en-CA" sz="1050" dirty="0" smtClean="0"/>
           </a:p>
           <a:p>
             <a:pPr marL="742950" lvl="1" indent="-285750">
@@ -6261,7 +6237,7 @@
           <p:nvPr/>
         </p:nvPicPr>
         <p:blipFill>
-          <a:blip r:embed="rId5">
+          <a:blip r:embed="rId5" cstate="print">
             <a:extLst>
               <a:ext uri="{28A0092B-C50C-407E-A947-70E740481C1C}">
                 <a14:useLocalDpi xmlns:a14="http://schemas.microsoft.com/office/drawing/2010/main" val="0"/>
@@ -6274,8 +6250,8 @@
         </p:blipFill>
         <p:spPr>
           <a:xfrm>
-            <a:off x="8052248" y="558133"/>
-            <a:ext cx="3480921" cy="2957925"/>
+            <a:off x="8052248" y="813791"/>
+            <a:ext cx="3480921" cy="2446609"/>
           </a:xfrm>
           <a:prstGeom prst="rect">
             <a:avLst/>

</xml_diff>